<commit_message>
added google trends script and output
</commit_message>
<xml_diff>
--- a/datathon/workflow.pptx
+++ b/datathon/workflow.pptx
@@ -109,6 +109,11 @@
       </a:defRPr>
     </a:lvl9pPr>
   </p:defaultTextStyle>
+  <p:extLst>
+    <p:ext uri="{EFAFB233-063F-42B5-8137-9DF3F51BA10A}">
+      <p15:sldGuideLst xmlns:p15="http://schemas.microsoft.com/office/powerpoint/2012/main"/>
+    </p:ext>
+  </p:extLst>
 </p:presentation>
 </file>
 
@@ -194,7 +199,7 @@
           <a:p>
             <a:fld id="{6723294E-CA93-4314-A198-83E630DE1D53}" type="datetimeFigureOut">
               <a:rPr lang="en-US" smtClean="0"/>
-              <a:t>12/26/19</a:t>
+              <a:t>12/30/19</a:t>
             </a:fld>
             <a:endParaRPr lang="en-US"/>
           </a:p>
@@ -772,7 +777,7 @@
           <a:p>
             <a:fld id="{25A65835-65FE-4D69-8C3D-C46F056BDB7F}" type="datetimeFigureOut">
               <a:rPr lang="en-US" smtClean="0"/>
-              <a:t>12/26/19</a:t>
+              <a:t>12/30/19</a:t>
             </a:fld>
             <a:endParaRPr lang="en-US"/>
           </a:p>
@@ -980,7 +985,7 @@
           <a:p>
             <a:fld id="{25A65835-65FE-4D69-8C3D-C46F056BDB7F}" type="datetimeFigureOut">
               <a:rPr lang="en-US" smtClean="0"/>
-              <a:t>12/26/19</a:t>
+              <a:t>12/30/19</a:t>
             </a:fld>
             <a:endParaRPr lang="en-US"/>
           </a:p>
@@ -1236,7 +1241,7 @@
           <a:p>
             <a:fld id="{25A65835-65FE-4D69-8C3D-C46F056BDB7F}" type="datetimeFigureOut">
               <a:rPr lang="en-US" smtClean="0"/>
-              <a:t>12/26/19</a:t>
+              <a:t>12/30/19</a:t>
             </a:fld>
             <a:endParaRPr lang="en-US"/>
           </a:p>
@@ -1815,7 +1820,7 @@
           <a:p>
             <a:fld id="{25A65835-65FE-4D69-8C3D-C46F056BDB7F}" type="datetimeFigureOut">
               <a:rPr lang="en-US" smtClean="0"/>
-              <a:t>12/26/19</a:t>
+              <a:t>12/30/19</a:t>
             </a:fld>
             <a:endParaRPr lang="en-US"/>
           </a:p>
@@ -2525,7 +2530,7 @@
           <a:p>
             <a:fld id="{25A65835-65FE-4D69-8C3D-C46F056BDB7F}" type="datetimeFigureOut">
               <a:rPr lang="en-US" smtClean="0"/>
-              <a:t>12/26/19</a:t>
+              <a:t>12/30/19</a:t>
             </a:fld>
             <a:endParaRPr lang="en-US"/>
           </a:p>
@@ -3009,7 +3014,7 @@
           <a:p>
             <a:fld id="{25A65835-65FE-4D69-8C3D-C46F056BDB7F}" type="datetimeFigureOut">
               <a:rPr lang="en-US" smtClean="0"/>
-              <a:t>12/26/19</a:t>
+              <a:t>12/30/19</a:t>
             </a:fld>
             <a:endParaRPr lang="en-US"/>
           </a:p>
@@ -3391,7 +3396,7 @@
           <a:p>
             <a:fld id="{25A65835-65FE-4D69-8C3D-C46F056BDB7F}" type="datetimeFigureOut">
               <a:rPr lang="en-US" smtClean="0"/>
-              <a:t>12/26/19</a:t>
+              <a:t>12/30/19</a:t>
             </a:fld>
             <a:endParaRPr lang="en-US"/>
           </a:p>
@@ -3678,7 +3683,7 @@
           <a:p>
             <a:fld id="{25A65835-65FE-4D69-8C3D-C46F056BDB7F}" type="datetimeFigureOut">
               <a:rPr lang="en-US" smtClean="0"/>
-              <a:t>12/26/19</a:t>
+              <a:t>12/30/19</a:t>
             </a:fld>
             <a:endParaRPr lang="en-US"/>
           </a:p>
@@ -4400,6 +4405,13 @@
           </a:p>
           <a:p>
             <a:pPr lvl="1"/>
+            <a:r>
+              <a:rPr lang="en-US" dirty="0" smtClean="0"/>
+              <a:t>Averaged temperature across Singapore</a:t>
+            </a:r>
+          </a:p>
+          <a:p>
+            <a:pPr lvl="1"/>
             <a:endParaRPr lang="en-US" dirty="0"/>
           </a:p>
         </p:txBody>
@@ -4469,370 +4481,444 @@
         </p:nvSpPr>
         <p:spPr/>
         <p:txBody>
+          <a:bodyPr>
+            <a:normAutofit lnSpcReduction="10000"/>
+          </a:bodyPr>
+          <a:lstStyle/>
+          <a:p>
+            <a:r>
+              <a:rPr lang="en-US" dirty="0" smtClean="0"/>
+              <a:t>Use dengue-sg-log as output [1]</a:t>
+            </a:r>
+          </a:p>
+          <a:p>
+            <a:r>
+              <a:rPr lang="en-US" dirty="0" smtClean="0"/>
+              <a:t>Temperature data in 4-week blocks [2]</a:t>
+            </a:r>
+          </a:p>
+          <a:p>
+            <a:pPr lvl="1"/>
+            <a:r>
+              <a:rPr lang="en-US" dirty="0" smtClean="0"/>
+              <a:t>Use mean of temperature-</a:t>
+            </a:r>
+            <a:r>
+              <a:rPr lang="en-US" dirty="0" err="1" smtClean="0"/>
+              <a:t>avg</a:t>
+            </a:r>
+            <a:r>
+              <a:rPr lang="en-US" dirty="0" smtClean="0"/>
+              <a:t> for weeks -5:-8, -9:-12, -13:-16, and -17:-20</a:t>
+            </a:r>
+          </a:p>
+          <a:p>
+            <a:pPr lvl="1"/>
+            <a:r>
+              <a:rPr lang="en-US" dirty="0" smtClean="0"/>
+              <a:t>Label mean temperature-</a:t>
+            </a:r>
+            <a:r>
+              <a:rPr lang="en-US" dirty="0" err="1" smtClean="0"/>
+              <a:t>avg</a:t>
+            </a:r>
+            <a:r>
+              <a:rPr lang="en-US" dirty="0" smtClean="0"/>
+              <a:t> for weeks -17:-20</a:t>
+            </a:r>
+          </a:p>
+          <a:p>
+            <a:pPr lvl="2"/>
+            <a:r>
+              <a:rPr lang="en-US" dirty="0" smtClean="0"/>
+              <a:t>&lt; 27.8 </a:t>
+            </a:r>
+            <a:r>
+              <a:rPr lang="en-US" dirty="0" err="1" smtClean="0"/>
+              <a:t>degC</a:t>
+            </a:r>
+            <a:r>
+              <a:rPr lang="en-US" dirty="0" smtClean="0"/>
+              <a:t> as 1 else 0</a:t>
+            </a:r>
+          </a:p>
+          <a:p>
+            <a:r>
+              <a:rPr lang="en-US" dirty="0" smtClean="0"/>
+              <a:t>Rainfall data in 4-week blocks [2]</a:t>
+            </a:r>
+          </a:p>
+          <a:p>
+            <a:pPr lvl="1"/>
+            <a:r>
+              <a:rPr lang="en-US" dirty="0"/>
+              <a:t>Use mean of </a:t>
+            </a:r>
+            <a:r>
+              <a:rPr lang="en-US" dirty="0" smtClean="0"/>
+              <a:t>rainfall-</a:t>
+            </a:r>
+            <a:r>
+              <a:rPr lang="en-US" dirty="0" err="1" smtClean="0"/>
+              <a:t>avg</a:t>
+            </a:r>
+            <a:r>
+              <a:rPr lang="en-US" dirty="0" smtClean="0"/>
+              <a:t> </a:t>
+            </a:r>
+            <a:r>
+              <a:rPr lang="en-US" dirty="0"/>
+              <a:t>for weeks </a:t>
+            </a:r>
+            <a:r>
+              <a:rPr lang="en-US" dirty="0" smtClean="0"/>
+              <a:t>-1:-4, -5</a:t>
+            </a:r>
+            <a:r>
+              <a:rPr lang="en-US" dirty="0"/>
+              <a:t>:-8, -9:-12, -13:-16, and -17:-</a:t>
+            </a:r>
+            <a:r>
+              <a:rPr lang="en-US" dirty="0" smtClean="0"/>
+              <a:t>20</a:t>
+            </a:r>
+          </a:p>
+          <a:p>
+            <a:pPr lvl="1"/>
+            <a:r>
+              <a:rPr lang="en-US" dirty="0" smtClean="0"/>
+              <a:t>Label mean rainfall-</a:t>
+            </a:r>
+            <a:r>
+              <a:rPr lang="en-US" dirty="0" err="1" smtClean="0"/>
+              <a:t>avg</a:t>
+            </a:r>
+            <a:r>
+              <a:rPr lang="en-US" dirty="0" smtClean="0"/>
+              <a:t> for weeks -13:-16</a:t>
+            </a:r>
+          </a:p>
+          <a:p>
+            <a:pPr lvl="2"/>
+            <a:r>
+              <a:rPr lang="en-US" dirty="0" smtClean="0"/>
+              <a:t>&lt; 10.7 mm || &gt; 21.4 mm as 1 else 0</a:t>
+            </a:r>
+          </a:p>
+          <a:p>
+            <a:pPr lvl="1"/>
+            <a:r>
+              <a:rPr lang="en-US" dirty="0" smtClean="0"/>
+              <a:t>Use mean of max consecutive rainy days (rainfall-</a:t>
+            </a:r>
+            <a:r>
+              <a:rPr lang="en-US" dirty="0" err="1" smtClean="0"/>
+              <a:t>avg</a:t>
+            </a:r>
+            <a:r>
+              <a:rPr lang="en-US" dirty="0" smtClean="0"/>
+              <a:t> &gt; 0) for weeks -1:-4, -5:-8, -9:-12</a:t>
+            </a:r>
+          </a:p>
+          <a:p>
+            <a:pPr lvl="2"/>
+            <a:r>
+              <a:rPr lang="en-US" dirty="0" smtClean="0"/>
+              <a:t>A combination of high and low consecutive rainy days could create stagnant conditions</a:t>
+            </a:r>
+          </a:p>
+          <a:p>
+            <a:pPr lvl="2"/>
+            <a:r>
+              <a:rPr lang="en-US" dirty="0" smtClean="0"/>
+              <a:t>High consecutive rainy days could also create flush events [3]</a:t>
+            </a:r>
+            <a:endParaRPr lang="en-US" dirty="0"/>
+          </a:p>
+          <a:p>
+            <a:r>
+              <a:rPr lang="en-US" dirty="0" smtClean="0"/>
+              <a:t>Normalized population-sg</a:t>
+            </a:r>
+          </a:p>
+          <a:p>
+            <a:pPr lvl="1"/>
+            <a:r>
+              <a:rPr lang="en-US" dirty="0" smtClean="0"/>
+              <a:t>Mean of weeks -1:-20</a:t>
+            </a:r>
+          </a:p>
+          <a:p>
+            <a:r>
+              <a:rPr lang="en-US" dirty="0" smtClean="0"/>
+              <a:t>dengue-sg-log [1]</a:t>
+            </a:r>
+          </a:p>
+          <a:p>
+            <a:pPr lvl="1"/>
+            <a:r>
+              <a:rPr lang="en-US" dirty="0" smtClean="0"/>
+              <a:t>Weeks -1:-6</a:t>
+            </a:r>
+          </a:p>
+          <a:p>
+            <a:r>
+              <a:rPr lang="en-US" dirty="0" smtClean="0"/>
+              <a:t>Absolute humidity [4]</a:t>
+            </a:r>
+          </a:p>
+          <a:p>
+            <a:pPr lvl="1"/>
+            <a:r>
+              <a:rPr lang="en-US" dirty="0"/>
+              <a:t>Cross-Correlation </a:t>
+            </a:r>
+            <a:r>
+              <a:rPr lang="en-US" smtClean="0"/>
+              <a:t>Analysis showed lag week = 4</a:t>
+            </a:r>
+            <a:endParaRPr lang="en-US" dirty="0" smtClean="0"/>
+          </a:p>
+          <a:p>
+            <a:pPr lvl="1"/>
+            <a:endParaRPr lang="en-US" dirty="0" smtClean="0"/>
+          </a:p>
+        </p:txBody>
+      </p:sp>
+      <p:sp>
+        <p:nvSpPr>
+          <p:cNvPr id="4" name="Footer Placeholder 3"/>
+          <p:cNvSpPr>
+            <a:spLocks noGrp="1"/>
+          </p:cNvSpPr>
+          <p:nvPr>
+            <p:ph type="ftr" sz="quarter" idx="11"/>
+          </p:nvPr>
+        </p:nvSpPr>
+        <p:spPr/>
+        <p:txBody>
           <a:bodyPr/>
           <a:lstStyle/>
           <a:p>
             <a:r>
-              <a:rPr lang="en-US" dirty="0" smtClean="0"/>
-              <a:t>Use dengue-sg-log as output [1]</a:t>
-            </a:r>
-          </a:p>
-          <a:p>
-            <a:r>
-              <a:rPr lang="en-US" dirty="0" smtClean="0"/>
-              <a:t>Temperature data in 4-week blocks [2]</a:t>
-            </a:r>
-          </a:p>
-          <a:p>
-            <a:pPr lvl="1"/>
-            <a:r>
-              <a:rPr lang="en-US" dirty="0" smtClean="0"/>
-              <a:t>Use mean of temperature-</a:t>
-            </a:r>
-            <a:r>
-              <a:rPr lang="en-US" dirty="0" err="1" smtClean="0"/>
-              <a:t>avg</a:t>
-            </a:r>
-            <a:r>
-              <a:rPr lang="en-US" dirty="0" smtClean="0"/>
-              <a:t> for weeks -5:-8, -9:-12, -13:-16, and -17:-20</a:t>
-            </a:r>
-          </a:p>
-          <a:p>
-            <a:pPr lvl="1"/>
-            <a:r>
-              <a:rPr lang="en-US" dirty="0" smtClean="0"/>
-              <a:t>Label mean temperature-</a:t>
-            </a:r>
-            <a:r>
-              <a:rPr lang="en-US" dirty="0" err="1" smtClean="0"/>
-              <a:t>avg</a:t>
-            </a:r>
-            <a:r>
-              <a:rPr lang="en-US" dirty="0" smtClean="0"/>
-              <a:t> for weeks -17:-20</a:t>
-            </a:r>
-          </a:p>
-          <a:p>
-            <a:pPr lvl="2"/>
-            <a:r>
-              <a:rPr lang="en-US" dirty="0" smtClean="0"/>
-              <a:t>&lt; 27.8 </a:t>
-            </a:r>
-            <a:r>
-              <a:rPr lang="en-US" dirty="0" err="1" smtClean="0"/>
-              <a:t>degC</a:t>
-            </a:r>
-            <a:r>
-              <a:rPr lang="en-US" dirty="0" smtClean="0"/>
-              <a:t> as 1 else 0</a:t>
-            </a:r>
-          </a:p>
-          <a:p>
-            <a:r>
-              <a:rPr lang="en-US" dirty="0" smtClean="0"/>
-              <a:t>Rainfall data in 4-week blocks [2]</a:t>
-            </a:r>
-          </a:p>
-          <a:p>
-            <a:pPr lvl="1"/>
-            <a:r>
-              <a:rPr lang="en-US" dirty="0"/>
-              <a:t>Use mean of </a:t>
-            </a:r>
-            <a:r>
-              <a:rPr lang="en-US" dirty="0" smtClean="0"/>
-              <a:t>rainfall-</a:t>
-            </a:r>
-            <a:r>
-              <a:rPr lang="en-US" dirty="0" err="1" smtClean="0"/>
-              <a:t>avg</a:t>
-            </a:r>
-            <a:r>
-              <a:rPr lang="en-US" dirty="0" smtClean="0"/>
-              <a:t> </a:t>
-            </a:r>
-            <a:r>
-              <a:rPr lang="en-US" dirty="0"/>
-              <a:t>for weeks </a:t>
-            </a:r>
-            <a:r>
-              <a:rPr lang="en-US" dirty="0" smtClean="0"/>
-              <a:t>-1:-4, -5</a:t>
-            </a:r>
-            <a:r>
-              <a:rPr lang="en-US" dirty="0"/>
-              <a:t>:-8, -9:-12, -13:-16, and -17:-</a:t>
-            </a:r>
-            <a:r>
-              <a:rPr lang="en-US" dirty="0" smtClean="0"/>
-              <a:t>20</a:t>
-            </a:r>
-          </a:p>
-          <a:p>
-            <a:pPr lvl="1"/>
-            <a:r>
-              <a:rPr lang="en-US" dirty="0" smtClean="0"/>
-              <a:t>Label mean rainfall-</a:t>
-            </a:r>
-            <a:r>
-              <a:rPr lang="en-US" dirty="0" err="1" smtClean="0"/>
-              <a:t>avg</a:t>
-            </a:r>
-            <a:r>
-              <a:rPr lang="en-US" dirty="0" smtClean="0"/>
-              <a:t> for weeks -13:-16</a:t>
-            </a:r>
-          </a:p>
-          <a:p>
-            <a:pPr lvl="2"/>
-            <a:r>
-              <a:rPr lang="en-US" dirty="0" smtClean="0"/>
-              <a:t>&lt; 10.7 mm || &gt; 21.4 mm as 1 else 0</a:t>
-            </a:r>
-          </a:p>
-          <a:p>
-            <a:pPr lvl="1"/>
-            <a:r>
-              <a:rPr lang="en-US" dirty="0" smtClean="0"/>
-              <a:t>Use mean of max consecutive rainy days (rainfall-</a:t>
-            </a:r>
-            <a:r>
-              <a:rPr lang="en-US" dirty="0" err="1" smtClean="0"/>
-              <a:t>avg</a:t>
-            </a:r>
-            <a:r>
-              <a:rPr lang="en-US" dirty="0" smtClean="0"/>
-              <a:t> &gt; 0) for weeks -1:-4, -5:-8, -9:-12</a:t>
-            </a:r>
-          </a:p>
-          <a:p>
-            <a:pPr lvl="2"/>
-            <a:r>
-              <a:rPr lang="en-US" dirty="0" smtClean="0"/>
-              <a:t>A combination of high and low consecutive rainy days could create stagnant conditions</a:t>
-            </a:r>
-          </a:p>
-          <a:p>
-            <a:pPr lvl="2"/>
-            <a:r>
-              <a:rPr lang="en-US" dirty="0" smtClean="0"/>
-              <a:t>High consecutive rainy days could also create flush events [3]</a:t>
-            </a:r>
-            <a:endParaRPr lang="en-US" dirty="0"/>
-          </a:p>
-          <a:p>
-            <a:r>
-              <a:rPr lang="en-US" dirty="0" smtClean="0"/>
-              <a:t>Normalized population-sg</a:t>
-            </a:r>
-          </a:p>
-          <a:p>
-            <a:pPr lvl="1"/>
-            <a:r>
-              <a:rPr lang="en-US" dirty="0" smtClean="0"/>
-              <a:t>Mean of weeks -1:-20</a:t>
-            </a:r>
-          </a:p>
-          <a:p>
-            <a:r>
-              <a:rPr lang="en-US" dirty="0" smtClean="0"/>
-              <a:t>dengue-sg-log [1]</a:t>
-            </a:r>
-          </a:p>
-          <a:p>
-            <a:pPr lvl="1"/>
-            <a:r>
-              <a:rPr lang="en-US" dirty="0" smtClean="0"/>
-              <a:t>Weeks -1:-6</a:t>
-            </a:r>
-          </a:p>
-          <a:p>
-            <a:pPr lvl="1"/>
-            <a:endParaRPr lang="en-US" dirty="0" smtClean="0"/>
-          </a:p>
-        </p:txBody>
-      </p:sp>
-      <p:sp>
-        <p:nvSpPr>
-          <p:cNvPr id="4" name="Footer Placeholder 3"/>
-          <p:cNvSpPr>
-            <a:spLocks noGrp="1"/>
-          </p:cNvSpPr>
-          <p:nvPr>
-            <p:ph type="ftr" sz="quarter" idx="11"/>
-          </p:nvPr>
-        </p:nvSpPr>
-        <p:spPr/>
-        <p:txBody>
-          <a:bodyPr/>
-          <a:lstStyle/>
-          <a:p>
-            <a:r>
-              <a:rPr lang="en-US" dirty="0"/>
+              <a:rPr lang="en-US" sz="600" dirty="0"/>
               <a:t>[</a:t>
             </a:r>
             <a:r>
-              <a:rPr lang="en-US" dirty="0" smtClean="0"/>
+              <a:rPr lang="en-US" sz="600" dirty="0" smtClean="0"/>
               <a:t>1] Y</a:t>
             </a:r>
             <a:r>
-              <a:rPr lang="en-US" dirty="0"/>
+              <a:rPr lang="en-US" sz="600" dirty="0"/>
               <a:t>. L. </a:t>
             </a:r>
             <a:r>
-              <a:rPr lang="en-US" dirty="0" err="1"/>
+              <a:rPr lang="en-US" sz="600" dirty="0" err="1"/>
               <a:t>Hii</a:t>
             </a:r>
             <a:r>
-              <a:rPr lang="en-US" dirty="0"/>
+              <a:rPr lang="en-US" sz="600" dirty="0"/>
               <a:t>, H. Zhu, N. Ng, L. C. Ng, and J. </a:t>
             </a:r>
             <a:r>
-              <a:rPr lang="en-US" dirty="0" err="1"/>
+              <a:rPr lang="en-US" sz="600" dirty="0" err="1"/>
               <a:t>Rocklöv</a:t>
             </a:r>
             <a:r>
-              <a:rPr lang="en-US" dirty="0"/>
+              <a:rPr lang="en-US" sz="600" dirty="0"/>
               <a:t>, “Forecast of Dengue Incidence Using Temperature and Rainfall,” </a:t>
             </a:r>
             <a:r>
-              <a:rPr lang="en-US" i="1" dirty="0"/>
+              <a:rPr lang="en-US" sz="600" i="1" dirty="0"/>
               <a:t>PLOS Neglected Tropical Diseases</a:t>
             </a:r>
             <a:r>
-              <a:rPr lang="en-US" dirty="0"/>
+              <a:rPr lang="en-US" sz="600" dirty="0"/>
               <a:t>, vol. 6, no. 11, p. e1908, Nov. 2012, </a:t>
             </a:r>
             <a:r>
-              <a:rPr lang="en-US" dirty="0" err="1"/>
+              <a:rPr lang="en-US" sz="600" dirty="0" err="1"/>
               <a:t>doi</a:t>
             </a:r>
             <a:r>
-              <a:rPr lang="en-US" dirty="0"/>
+              <a:rPr lang="en-US" sz="600" dirty="0"/>
               <a:t>: 10.1371/journal.pntd.0001908</a:t>
             </a:r>
             <a:r>
-              <a:rPr lang="en-US" dirty="0" smtClean="0"/>
+              <a:rPr lang="en-US" sz="600" dirty="0" smtClean="0"/>
               <a:t>.</a:t>
             </a:r>
           </a:p>
           <a:p>
             <a:r>
-              <a:rPr lang="en-US" dirty="0" smtClean="0"/>
+              <a:rPr lang="en-US" sz="600" dirty="0" smtClean="0"/>
               <a:t>[2] Y</a:t>
             </a:r>
             <a:r>
-              <a:rPr lang="en-US" dirty="0"/>
+              <a:rPr lang="en-US" sz="600" dirty="0"/>
               <a:t>. L. </a:t>
             </a:r>
             <a:r>
-              <a:rPr lang="en-US" dirty="0" err="1"/>
+              <a:rPr lang="en-US" sz="600" dirty="0" err="1"/>
               <a:t>Hii</a:t>
             </a:r>
             <a:r>
-              <a:rPr lang="en-US" dirty="0"/>
+              <a:rPr lang="en-US" sz="600" dirty="0"/>
               <a:t>, J. </a:t>
             </a:r>
             <a:r>
-              <a:rPr lang="en-US" dirty="0" err="1"/>
+              <a:rPr lang="en-US" sz="600" dirty="0" err="1"/>
               <a:t>Rocklöv</a:t>
             </a:r>
             <a:r>
-              <a:rPr lang="en-US" dirty="0"/>
+              <a:rPr lang="en-US" sz="600" dirty="0"/>
               <a:t>, N. Ng, C. S. Tang, F. Y. Pang, and R. </a:t>
             </a:r>
             <a:r>
-              <a:rPr lang="en-US" dirty="0" err="1"/>
+              <a:rPr lang="en-US" sz="600" dirty="0" err="1"/>
               <a:t>Sauerborn</a:t>
             </a:r>
             <a:r>
-              <a:rPr lang="en-US" dirty="0"/>
+              <a:rPr lang="en-US" sz="600" dirty="0"/>
               <a:t>, “Climate variability and increase in intensity and magnitude of dengue incidence in Singapore,” </a:t>
             </a:r>
             <a:r>
-              <a:rPr lang="en-US" i="1" dirty="0"/>
+              <a:rPr lang="en-US" sz="600" i="1" dirty="0"/>
               <a:t>Glob Health Action</a:t>
             </a:r>
             <a:r>
-              <a:rPr lang="en-US" dirty="0"/>
+              <a:rPr lang="en-US" sz="600" dirty="0"/>
               <a:t>, vol. 2, Nov. 2009, </a:t>
             </a:r>
             <a:r>
-              <a:rPr lang="en-US" dirty="0" err="1"/>
+              <a:rPr lang="en-US" sz="600" dirty="0" err="1"/>
               <a:t>doi</a:t>
             </a:r>
             <a:r>
-              <a:rPr lang="en-US" dirty="0"/>
+              <a:rPr lang="en-US" sz="600" dirty="0"/>
               <a:t>: 10.3402/gha.v2i0.2036</a:t>
             </a:r>
             <a:r>
-              <a:rPr lang="en-US" dirty="0" smtClean="0"/>
+              <a:rPr lang="en-US" sz="600" dirty="0" smtClean="0"/>
               <a:t>.</a:t>
             </a:r>
           </a:p>
           <a:p>
             <a:r>
-              <a:rPr lang="en-US" dirty="0" smtClean="0"/>
+              <a:rPr lang="en-US" sz="600" dirty="0" smtClean="0"/>
               <a:t>[3] C</a:t>
             </a:r>
             <a:r>
-              <a:rPr lang="en-US" dirty="0"/>
+              <a:rPr lang="en-US" sz="600" dirty="0"/>
               <a:t>. M. </a:t>
             </a:r>
             <a:r>
-              <a:rPr lang="en-US" dirty="0" err="1"/>
+              <a:rPr lang="en-US" sz="600" dirty="0" err="1"/>
               <a:t>Benedum</a:t>
             </a:r>
             <a:r>
-              <a:rPr lang="en-US" dirty="0"/>
+              <a:rPr lang="en-US" sz="600" dirty="0"/>
               <a:t>, O. M. E. </a:t>
             </a:r>
             <a:r>
-              <a:rPr lang="en-US" dirty="0" err="1"/>
+              <a:rPr lang="en-US" sz="600" dirty="0" err="1"/>
               <a:t>Seidahmed</a:t>
             </a:r>
             <a:r>
-              <a:rPr lang="en-US" dirty="0"/>
+              <a:rPr lang="en-US" sz="600" dirty="0"/>
               <a:t>, E. A. B. </a:t>
             </a:r>
             <a:r>
-              <a:rPr lang="en-US" dirty="0" err="1"/>
+              <a:rPr lang="en-US" sz="600" dirty="0" err="1"/>
               <a:t>Eltahir</a:t>
             </a:r>
             <a:r>
-              <a:rPr lang="en-US" dirty="0"/>
+              <a:rPr lang="en-US" sz="600" dirty="0"/>
               <a:t>, and N. </a:t>
             </a:r>
             <a:r>
-              <a:rPr lang="en-US" dirty="0" err="1"/>
+              <a:rPr lang="en-US" sz="600" dirty="0" err="1"/>
               <a:t>Markuzon</a:t>
             </a:r>
             <a:r>
-              <a:rPr lang="en-US" dirty="0"/>
+              <a:rPr lang="en-US" sz="600" dirty="0"/>
               <a:t>, “Statistical modeling of the effect of rainfall flushing on dengue transmission in Singapore,” </a:t>
             </a:r>
             <a:r>
-              <a:rPr lang="en-US" i="1" dirty="0"/>
+              <a:rPr lang="en-US" sz="600" i="1" dirty="0"/>
               <a:t>PLOS Neglected Tropical Diseases</a:t>
             </a:r>
             <a:r>
-              <a:rPr lang="en-US" dirty="0"/>
+              <a:rPr lang="en-US" sz="600" dirty="0"/>
               <a:t>, vol. 12, no. 12, p. e0006935, Dec. 2018, </a:t>
             </a:r>
             <a:r>
-              <a:rPr lang="en-US" dirty="0" err="1"/>
+              <a:rPr lang="en-US" sz="600" dirty="0" err="1"/>
               <a:t>doi</a:t>
             </a:r>
             <a:r>
-              <a:rPr lang="en-US" dirty="0"/>
+              <a:rPr lang="en-US" sz="600" dirty="0"/>
               <a:t>: 10.1371/journal.pntd.0006935</a:t>
             </a:r>
             <a:r>
-              <a:rPr lang="en-US" dirty="0" smtClean="0"/>
+              <a:rPr lang="en-US" sz="600" dirty="0" smtClean="0"/>
               <a:t>.</a:t>
             </a:r>
-            <a:endParaRPr lang="en-US" dirty="0"/>
+          </a:p>
+          <a:p>
+            <a:r>
+              <a:rPr lang="en-US" sz="600" dirty="0" smtClean="0"/>
+              <a:t>[4] T</a:t>
+            </a:r>
+            <a:r>
+              <a:rPr lang="en-US" sz="600" dirty="0"/>
+              <a:t>. M. </a:t>
+            </a:r>
+            <a:r>
+              <a:rPr lang="en-US" sz="600" dirty="0" err="1"/>
+              <a:t>Carvajal</a:t>
+            </a:r>
+            <a:r>
+              <a:rPr lang="en-US" sz="600" dirty="0"/>
+              <a:t>, K. M. </a:t>
+            </a:r>
+            <a:r>
+              <a:rPr lang="en-US" sz="600" dirty="0" err="1"/>
+              <a:t>Viacrusis</a:t>
+            </a:r>
+            <a:r>
+              <a:rPr lang="en-US" sz="600" dirty="0"/>
+              <a:t>, L. F. T. Hernandez, H. T. Ho, D. M. </a:t>
+            </a:r>
+            <a:r>
+              <a:rPr lang="en-US" sz="600" dirty="0" err="1"/>
+              <a:t>Amalin</a:t>
+            </a:r>
+            <a:r>
+              <a:rPr lang="en-US" sz="600" dirty="0"/>
+              <a:t>, and K. Watanabe, “Machine learning methods reveal the temporal pattern of dengue incidence using meteorological factors in metropolitan Manila, Philippines,” </a:t>
+            </a:r>
+            <a:r>
+              <a:rPr lang="en-US" sz="600" i="1" dirty="0"/>
+              <a:t>BMC Infect. Dis.</a:t>
+            </a:r>
+            <a:r>
+              <a:rPr lang="en-US" sz="600" dirty="0"/>
+              <a:t>, vol. 18, no. 1, p. 183, 17 2018, </a:t>
+            </a:r>
+            <a:r>
+              <a:rPr lang="en-US" sz="600" dirty="0" err="1"/>
+              <a:t>doi</a:t>
+            </a:r>
+            <a:r>
+              <a:rPr lang="en-US" sz="600" dirty="0"/>
+              <a:t>: 10.1186/s12879-018-3066-0</a:t>
+            </a:r>
+            <a:r>
+              <a:rPr lang="en-US" sz="600" dirty="0" smtClean="0"/>
+              <a:t>.</a:t>
+            </a:r>
+            <a:endParaRPr lang="en-US" sz="600" dirty="0"/>
           </a:p>
         </p:txBody>
       </p:sp>

</xml_diff>

<commit_message>
final version for prelim
</commit_message>
<xml_diff>
--- a/datathon/workflow.pptx
+++ b/datathon/workflow.pptx
@@ -9,9 +9,9 @@
   </p:notesMasterIdLst>
   <p:sldIdLst>
     <p:sldId id="256" r:id="rId2"/>
-    <p:sldId id="259" r:id="rId3"/>
-    <p:sldId id="257" r:id="rId4"/>
-    <p:sldId id="258" r:id="rId5"/>
+    <p:sldId id="257" r:id="rId3"/>
+    <p:sldId id="258" r:id="rId4"/>
+    <p:sldId id="259" r:id="rId5"/>
   </p:sldIdLst>
   <p:sldSz cx="9144000" cy="6858000" type="screen4x3"/>
   <p:notesSz cx="6858000" cy="9144000"/>
@@ -200,7 +200,7 @@
           <a:p>
             <a:fld id="{6723294E-CA93-4314-A198-83E630DE1D53}" type="datetimeFigureOut">
               <a:rPr lang="en-US" smtClean="0"/>
-              <a:t>1/2/20</a:t>
+              <a:t>1/6/20</a:t>
             </a:fld>
             <a:endParaRPr lang="en-US"/>
           </a:p>
@@ -533,7 +533,91 @@
           <a:p>
             <a:fld id="{8F0942D9-9E13-472B-B08E-77234377D0A1}" type="slidenum">
               <a:rPr lang="en-US" smtClean="0"/>
-              <a:t>4</a:t>
+              <a:t>2</a:t>
+            </a:fld>
+            <a:endParaRPr lang="en-US"/>
+          </a:p>
+        </p:txBody>
+      </p:sp>
+    </p:spTree>
+    <p:extLst>
+      <p:ext uri="{BB962C8B-B14F-4D97-AF65-F5344CB8AC3E}">
+        <p14:creationId xmlns:p14="http://schemas.microsoft.com/office/powerpoint/2010/main" val="4160984434"/>
+      </p:ext>
+    </p:extLst>
+  </p:cSld>
+  <p:clrMapOvr>
+    <a:masterClrMapping/>
+  </p:clrMapOvr>
+</p:notes>
+</file>
+
+<file path=ppt/notesSlides/notesSlide2.xml><?xml version="1.0" encoding="utf-8"?>
+<p:notes xmlns:a="http://schemas.openxmlformats.org/drawingml/2006/main" xmlns:r="http://schemas.openxmlformats.org/officeDocument/2006/relationships" xmlns:p="http://schemas.openxmlformats.org/presentationml/2006/main">
+  <p:cSld>
+    <p:spTree>
+      <p:nvGrpSpPr>
+        <p:cNvPr id="1" name=""/>
+        <p:cNvGrpSpPr/>
+        <p:nvPr/>
+      </p:nvGrpSpPr>
+      <p:grpSpPr>
+        <a:xfrm>
+          <a:off x="0" y="0"/>
+          <a:ext cx="0" cy="0"/>
+          <a:chOff x="0" y="0"/>
+          <a:chExt cx="0" cy="0"/>
+        </a:xfrm>
+      </p:grpSpPr>
+      <p:sp>
+        <p:nvSpPr>
+          <p:cNvPr id="2" name="Slide Image Placeholder 1"/>
+          <p:cNvSpPr>
+            <a:spLocks noGrp="1" noRot="1" noChangeAspect="1"/>
+          </p:cNvSpPr>
+          <p:nvPr>
+            <p:ph type="sldImg"/>
+          </p:nvPr>
+        </p:nvSpPr>
+        <p:spPr/>
+      </p:sp>
+      <p:sp>
+        <p:nvSpPr>
+          <p:cNvPr id="3" name="Notes Placeholder 2"/>
+          <p:cNvSpPr>
+            <a:spLocks noGrp="1"/>
+          </p:cNvSpPr>
+          <p:nvPr>
+            <p:ph type="body" idx="1"/>
+          </p:nvPr>
+        </p:nvSpPr>
+        <p:spPr/>
+        <p:txBody>
+          <a:bodyPr/>
+          <a:lstStyle/>
+          <a:p>
+            <a:endParaRPr lang="en-US"/>
+          </a:p>
+        </p:txBody>
+      </p:sp>
+      <p:sp>
+        <p:nvSpPr>
+          <p:cNvPr id="4" name="Slide Number Placeholder 3"/>
+          <p:cNvSpPr>
+            <a:spLocks noGrp="1"/>
+          </p:cNvSpPr>
+          <p:nvPr>
+            <p:ph type="sldNum" sz="quarter" idx="10"/>
+          </p:nvPr>
+        </p:nvSpPr>
+        <p:spPr/>
+        <p:txBody>
+          <a:bodyPr/>
+          <a:lstStyle/>
+          <a:p>
+            <a:fld id="{8F0942D9-9E13-472B-B08E-77234377D0A1}" type="slidenum">
+              <a:rPr lang="en-US" smtClean="0"/>
+              <a:t>3</a:t>
             </a:fld>
             <a:endParaRPr lang="en-US"/>
           </a:p>
@@ -778,7 +862,7 @@
           <a:p>
             <a:fld id="{25A65835-65FE-4D69-8C3D-C46F056BDB7F}" type="datetimeFigureOut">
               <a:rPr lang="en-US" smtClean="0"/>
-              <a:t>1/2/20</a:t>
+              <a:t>1/6/20</a:t>
             </a:fld>
             <a:endParaRPr lang="en-US"/>
           </a:p>
@@ -986,7 +1070,7 @@
           <a:p>
             <a:fld id="{25A65835-65FE-4D69-8C3D-C46F056BDB7F}" type="datetimeFigureOut">
               <a:rPr lang="en-US" smtClean="0"/>
-              <a:t>1/2/20</a:t>
+              <a:t>1/6/20</a:t>
             </a:fld>
             <a:endParaRPr lang="en-US"/>
           </a:p>
@@ -1242,7 +1326,7 @@
           <a:p>
             <a:fld id="{25A65835-65FE-4D69-8C3D-C46F056BDB7F}" type="datetimeFigureOut">
               <a:rPr lang="en-US" smtClean="0"/>
-              <a:t>1/2/20</a:t>
+              <a:t>1/6/20</a:t>
             </a:fld>
             <a:endParaRPr lang="en-US"/>
           </a:p>
@@ -1821,7 +1905,7 @@
           <a:p>
             <a:fld id="{25A65835-65FE-4D69-8C3D-C46F056BDB7F}" type="datetimeFigureOut">
               <a:rPr lang="en-US" smtClean="0"/>
-              <a:t>1/2/20</a:t>
+              <a:t>1/6/20</a:t>
             </a:fld>
             <a:endParaRPr lang="en-US"/>
           </a:p>
@@ -2531,7 +2615,7 @@
           <a:p>
             <a:fld id="{25A65835-65FE-4D69-8C3D-C46F056BDB7F}" type="datetimeFigureOut">
               <a:rPr lang="en-US" smtClean="0"/>
-              <a:t>1/2/20</a:t>
+              <a:t>1/6/20</a:t>
             </a:fld>
             <a:endParaRPr lang="en-US"/>
           </a:p>
@@ -3015,7 +3099,7 @@
           <a:p>
             <a:fld id="{25A65835-65FE-4D69-8C3D-C46F056BDB7F}" type="datetimeFigureOut">
               <a:rPr lang="en-US" smtClean="0"/>
-              <a:t>1/2/20</a:t>
+              <a:t>1/6/20</a:t>
             </a:fld>
             <a:endParaRPr lang="en-US"/>
           </a:p>
@@ -3397,7 +3481,7 @@
           <a:p>
             <a:fld id="{25A65835-65FE-4D69-8C3D-C46F056BDB7F}" type="datetimeFigureOut">
               <a:rPr lang="en-US" smtClean="0"/>
-              <a:t>1/2/20</a:t>
+              <a:t>1/6/20</a:t>
             </a:fld>
             <a:endParaRPr lang="en-US"/>
           </a:p>
@@ -3684,7 +3768,7 @@
           <a:p>
             <a:fld id="{25A65835-65FE-4D69-8C3D-C46F056BDB7F}" type="datetimeFigureOut">
               <a:rPr lang="en-US" smtClean="0"/>
-              <a:t>1/2/20</a:t>
+              <a:t>1/6/20</a:t>
             </a:fld>
             <a:endParaRPr lang="en-US"/>
           </a:p>
@@ -4314,14 +4398,184 @@
           <a:bodyPr/>
           <a:lstStyle/>
           <a:p>
-            <a:endParaRPr lang="en-US"/>
+            <a:r>
+              <a:rPr lang="en-US" dirty="0" err="1" smtClean="0"/>
+              <a:t>Autocaffe</a:t>
+            </a:r>
+            <a:endParaRPr lang="en-US" dirty="0" smtClean="0"/>
+          </a:p>
+          <a:p>
+            <a:pPr lvl="1"/>
+            <a:r>
+              <a:rPr lang="en-US" dirty="0" smtClean="0"/>
+              <a:t>Verified that “dengue-sg” has no gaps in data</a:t>
+            </a:r>
+          </a:p>
+          <a:p>
+            <a:pPr lvl="1"/>
+            <a:r>
+              <a:rPr lang="en-US" dirty="0" smtClean="0"/>
+              <a:t>Average, maximum, minimum of temperature and rainfall aggregated from daily to weekly</a:t>
+            </a:r>
+          </a:p>
+          <a:p>
+            <a:pPr lvl="2"/>
+            <a:r>
+              <a:rPr lang="en-US" dirty="0" smtClean="0"/>
+              <a:t>Maximum consecutive days of rainfall (&gt; 0) within the </a:t>
+            </a:r>
+            <a:r>
+              <a:rPr lang="en-US" dirty="0" smtClean="0"/>
+              <a:t>week</a:t>
+            </a:r>
+            <a:endParaRPr lang="en-US" dirty="0"/>
+          </a:p>
+          <a:p>
+            <a:pPr lvl="2"/>
+            <a:r>
+              <a:rPr lang="en-US" dirty="0" smtClean="0"/>
+              <a:t>Number of rainy days (&gt; 0) within the week</a:t>
+            </a:r>
+          </a:p>
+          <a:p>
+            <a:pPr lvl="2"/>
+            <a:r>
+              <a:rPr lang="en-US" dirty="0" smtClean="0"/>
+              <a:t>Number of hot days (&gt; 27.8 </a:t>
+            </a:r>
+            <a:r>
+              <a:rPr lang="en-US" dirty="0" err="1" smtClean="0"/>
+              <a:t>degC</a:t>
+            </a:r>
+            <a:r>
+              <a:rPr lang="en-US" dirty="0" smtClean="0"/>
+              <a:t>) within the week</a:t>
+            </a:r>
+            <a:endParaRPr lang="en-US" dirty="0" smtClean="0"/>
+          </a:p>
+          <a:p>
+            <a:pPr lvl="1"/>
+            <a:r>
+              <a:rPr lang="en-US" dirty="0" smtClean="0"/>
+              <a:t>“population-sg” midyear average</a:t>
+            </a:r>
+          </a:p>
+          <a:p>
+            <a:r>
+              <a:rPr lang="en-US" dirty="0" smtClean="0"/>
+              <a:t>Python</a:t>
+            </a:r>
+          </a:p>
+          <a:p>
+            <a:pPr lvl="1"/>
+            <a:r>
+              <a:rPr lang="en-US" dirty="0" smtClean="0"/>
+              <a:t>Spatial average to 5 regions (north, northeast, west, east, central</a:t>
+            </a:r>
+            <a:r>
+              <a:rPr lang="en-US" dirty="0" smtClean="0"/>
+              <a:t>), and to sg</a:t>
+            </a:r>
+          </a:p>
+          <a:p>
+            <a:pPr lvl="1"/>
+            <a:r>
+              <a:rPr lang="en-US" dirty="0" smtClean="0"/>
+              <a:t>Compute absolute humidity from temperature-sg-</a:t>
+            </a:r>
+            <a:r>
+              <a:rPr lang="en-US" dirty="0" err="1" smtClean="0"/>
+              <a:t>avg</a:t>
+            </a:r>
+            <a:r>
+              <a:rPr lang="en-US" dirty="0" smtClean="0"/>
+              <a:t> and relative humidity</a:t>
+            </a:r>
+          </a:p>
+          <a:p>
+            <a:pPr lvl="1"/>
+            <a:r>
+              <a:rPr lang="en-US" dirty="0" smtClean="0"/>
+              <a:t>Use Holt-Winters method to extract trend (slope) and seasonality components [1]</a:t>
+            </a:r>
+          </a:p>
+          <a:p>
+            <a:pPr lvl="1"/>
+            <a:endParaRPr lang="en-US" dirty="0" smtClean="0"/>
+          </a:p>
+        </p:txBody>
+      </p:sp>
+      <p:sp>
+        <p:nvSpPr>
+          <p:cNvPr id="4" name="Footer Placeholder 3"/>
+          <p:cNvSpPr>
+            <a:spLocks noGrp="1"/>
+          </p:cNvSpPr>
+          <p:nvPr>
+            <p:ph type="ftr" sz="quarter" idx="11"/>
+          </p:nvPr>
+        </p:nvSpPr>
+        <p:spPr/>
+        <p:txBody>
+          <a:bodyPr/>
+          <a:lstStyle/>
+          <a:p>
+            <a:r>
+              <a:rPr lang="en-US" dirty="0"/>
+              <a:t>[</a:t>
+            </a:r>
+            <a:r>
+              <a:rPr lang="en-US" dirty="0" smtClean="0"/>
+              <a:t>1] Y</a:t>
+            </a:r>
+            <a:r>
+              <a:rPr lang="en-US" dirty="0"/>
+              <a:t>. Shi </a:t>
+            </a:r>
+            <a:r>
+              <a:rPr lang="en-US" i="1" dirty="0"/>
+              <a:t>et al.</a:t>
+            </a:r>
+            <a:r>
+              <a:rPr lang="en-US" dirty="0"/>
+              <a:t>, “Three-Month Real-Time Dengue Forecast Models: An Early Warning System for Outbreak Alerts and Policy Decision Support in Singapore,” </a:t>
+            </a:r>
+            <a:r>
+              <a:rPr lang="en-US" i="1" dirty="0"/>
+              <a:t>Environ. Health </a:t>
+            </a:r>
+            <a:r>
+              <a:rPr lang="en-US" i="1" dirty="0" err="1"/>
+              <a:t>Perspect</a:t>
+            </a:r>
+            <a:r>
+              <a:rPr lang="en-US" i="1" dirty="0"/>
+              <a:t>.</a:t>
+            </a:r>
+            <a:r>
+              <a:rPr lang="en-US" dirty="0"/>
+              <a:t>, vol. 124, no. 9, pp. 1369–1375, 2016, </a:t>
+            </a:r>
+            <a:r>
+              <a:rPr lang="en-US" dirty="0" err="1"/>
+              <a:t>doi</a:t>
+            </a:r>
+            <a:r>
+              <a:rPr lang="en-US" dirty="0"/>
+              <a:t>: 10.1289/ehp.1509981</a:t>
+            </a:r>
+            <a:r>
+              <a:rPr lang="en-US" dirty="0" smtClean="0"/>
+              <a:t>.</a:t>
+            </a:r>
+            <a:endParaRPr lang="en-US" dirty="0"/>
           </a:p>
         </p:txBody>
       </p:sp>
     </p:spTree>
     <p:extLst>
       <p:ext uri="{BB962C8B-B14F-4D97-AF65-F5344CB8AC3E}">
-        <p14:creationId xmlns:p14="http://schemas.microsoft.com/office/powerpoint/2010/main" val="2820005288"/>
+        <p14:creationId xmlns:p14="http://schemas.microsoft.com/office/powerpoint/2010/main" val="158578986"/>
       </p:ext>
     </p:extLst>
   </p:cSld>
@@ -4365,7 +4619,7 @@
           <a:p>
             <a:r>
               <a:rPr lang="en-US" dirty="0" smtClean="0"/>
-              <a:t>Data extraction</a:t>
+              <a:t>Feature engineering</a:t>
             </a:r>
             <a:endParaRPr lang="en-US" dirty="0"/>
           </a:p>
@@ -4379,6 +4633,324 @@
           </p:cNvSpPr>
           <p:nvPr>
             <p:ph idx="1"/>
+          </p:nvPr>
+        </p:nvSpPr>
+        <p:spPr/>
+        <p:txBody>
+          <a:bodyPr>
+            <a:normAutofit fontScale="85000" lnSpcReduction="20000"/>
+          </a:bodyPr>
+          <a:lstStyle/>
+          <a:p>
+            <a:r>
+              <a:rPr lang="en-US" dirty="0" smtClean="0"/>
+              <a:t>Use dengue-sg-log as output [1</a:t>
+            </a:r>
+            <a:r>
+              <a:rPr lang="en-US" dirty="0" smtClean="0"/>
+              <a:t>]</a:t>
+            </a:r>
+          </a:p>
+          <a:p>
+            <a:pPr lvl="1"/>
+            <a:r>
+              <a:rPr lang="en-US" dirty="0" smtClean="0"/>
+              <a:t>Gradient of 0 to -4 week dengue-sg-log</a:t>
+            </a:r>
+            <a:endParaRPr lang="en-US" dirty="0" smtClean="0"/>
+          </a:p>
+          <a:p>
+            <a:r>
+              <a:rPr lang="en-US" dirty="0" smtClean="0"/>
+              <a:t>Temperature data in 4-week blocks [2]</a:t>
+            </a:r>
+          </a:p>
+          <a:p>
+            <a:pPr lvl="1"/>
+            <a:r>
+              <a:rPr lang="en-US" dirty="0" smtClean="0"/>
+              <a:t>Use mean of temperature-</a:t>
+            </a:r>
+            <a:r>
+              <a:rPr lang="en-US" dirty="0" err="1" smtClean="0"/>
+              <a:t>avg</a:t>
+            </a:r>
+            <a:r>
+              <a:rPr lang="en-US" dirty="0" smtClean="0"/>
+              <a:t> for weeks </a:t>
+            </a:r>
+            <a:r>
+              <a:rPr lang="en-US" dirty="0" smtClean="0"/>
+              <a:t>0, -1:-4, -5</a:t>
+            </a:r>
+            <a:r>
+              <a:rPr lang="en-US" dirty="0" smtClean="0"/>
+              <a:t>:-8, -9:-12, -13:-16, and -17:-</a:t>
+            </a:r>
+            <a:r>
+              <a:rPr lang="en-US" dirty="0" smtClean="0"/>
+              <a:t>20</a:t>
+            </a:r>
+          </a:p>
+          <a:p>
+            <a:pPr lvl="2"/>
+            <a:r>
+              <a:rPr lang="en-US" dirty="0" smtClean="0"/>
+              <a:t>“normalized” by dividing 25</a:t>
+            </a:r>
+            <a:endParaRPr lang="en-US" dirty="0" smtClean="0"/>
+          </a:p>
+          <a:p>
+            <a:pPr lvl="1"/>
+            <a:r>
+              <a:rPr lang="en-US" dirty="0" smtClean="0"/>
+              <a:t>Label </a:t>
+            </a:r>
+            <a:r>
+              <a:rPr lang="en-US" dirty="0" smtClean="0"/>
+              <a:t>temperature-</a:t>
+            </a:r>
+            <a:r>
+              <a:rPr lang="en-US" dirty="0" err="1" smtClean="0"/>
+              <a:t>avg</a:t>
+            </a:r>
+            <a:r>
+              <a:rPr lang="en-US" dirty="0" smtClean="0"/>
+              <a:t> </a:t>
+            </a:r>
+            <a:r>
+              <a:rPr lang="en-US" dirty="0" smtClean="0"/>
+              <a:t>for weeks -17:-20</a:t>
+            </a:r>
+          </a:p>
+          <a:p>
+            <a:pPr lvl="2"/>
+            <a:r>
+              <a:rPr lang="en-US" dirty="0" smtClean="0"/>
+              <a:t>&lt; 27.8 </a:t>
+            </a:r>
+            <a:r>
+              <a:rPr lang="en-US" dirty="0" err="1" smtClean="0"/>
+              <a:t>degC</a:t>
+            </a:r>
+            <a:r>
+              <a:rPr lang="en-US" dirty="0" smtClean="0"/>
+              <a:t> as 1 else </a:t>
+            </a:r>
+            <a:r>
+              <a:rPr lang="en-US" dirty="0" smtClean="0"/>
+              <a:t>0</a:t>
+            </a:r>
+          </a:p>
+          <a:p>
+            <a:pPr lvl="1"/>
+            <a:r>
+              <a:rPr lang="en-US" dirty="0" smtClean="0"/>
+              <a:t>Mean number of hot days in a week</a:t>
+            </a:r>
+            <a:endParaRPr lang="en-US" dirty="0" smtClean="0"/>
+          </a:p>
+          <a:p>
+            <a:r>
+              <a:rPr lang="en-US" dirty="0" smtClean="0"/>
+              <a:t>Rainfall data in 4-week blocks [2]</a:t>
+            </a:r>
+          </a:p>
+          <a:p>
+            <a:pPr lvl="1"/>
+            <a:r>
+              <a:rPr lang="en-US" dirty="0"/>
+              <a:t>Use mean of </a:t>
+            </a:r>
+            <a:r>
+              <a:rPr lang="en-US" dirty="0" smtClean="0"/>
+              <a:t>rainfall-</a:t>
+            </a:r>
+            <a:r>
+              <a:rPr lang="en-US" dirty="0" err="1" smtClean="0"/>
+              <a:t>avg</a:t>
+            </a:r>
+            <a:r>
+              <a:rPr lang="en-US" dirty="0" smtClean="0"/>
+              <a:t> </a:t>
+            </a:r>
+            <a:r>
+              <a:rPr lang="en-US" dirty="0"/>
+              <a:t>for weeks </a:t>
+            </a:r>
+            <a:r>
+              <a:rPr lang="en-US" dirty="0" smtClean="0"/>
+              <a:t>-1:-4, -5</a:t>
+            </a:r>
+            <a:r>
+              <a:rPr lang="en-US" dirty="0"/>
+              <a:t>:-8, -9:-12, -13:-16, and -17:-</a:t>
+            </a:r>
+            <a:r>
+              <a:rPr lang="en-US" dirty="0" smtClean="0"/>
+              <a:t>20</a:t>
+            </a:r>
+          </a:p>
+          <a:p>
+            <a:pPr lvl="1"/>
+            <a:r>
+              <a:rPr lang="en-US" dirty="0" smtClean="0"/>
+              <a:t>Label mean rainfall-</a:t>
+            </a:r>
+            <a:r>
+              <a:rPr lang="en-US" dirty="0" err="1" smtClean="0"/>
+              <a:t>avg</a:t>
+            </a:r>
+            <a:r>
+              <a:rPr lang="en-US" dirty="0" smtClean="0"/>
+              <a:t> for weeks -13:-16</a:t>
+            </a:r>
+          </a:p>
+          <a:p>
+            <a:pPr lvl="2"/>
+            <a:r>
+              <a:rPr lang="en-US" dirty="0" smtClean="0"/>
+              <a:t>&lt; 10.7 mm || &gt; 21.4 mm as 1 else 0</a:t>
+            </a:r>
+          </a:p>
+          <a:p>
+            <a:pPr lvl="1"/>
+            <a:r>
+              <a:rPr lang="en-US" dirty="0"/>
+              <a:t>Use mean of </a:t>
+            </a:r>
+            <a:r>
+              <a:rPr lang="en-US" dirty="0" smtClean="0"/>
+              <a:t>weekly rainy </a:t>
+            </a:r>
+            <a:r>
+              <a:rPr lang="en-US" dirty="0"/>
+              <a:t>days (rainfall-</a:t>
+            </a:r>
+            <a:r>
+              <a:rPr lang="en-US" dirty="0" err="1"/>
+              <a:t>avg</a:t>
+            </a:r>
+            <a:r>
+              <a:rPr lang="en-US" dirty="0"/>
+              <a:t> &gt; 0) for weeks -1:-4, -5:-8, -9:-</a:t>
+            </a:r>
+            <a:r>
+              <a:rPr lang="en-US" dirty="0" smtClean="0"/>
+              <a:t>12, -13:-16, -17:-20</a:t>
+            </a:r>
+            <a:endParaRPr lang="en-US" dirty="0"/>
+          </a:p>
+          <a:p>
+            <a:pPr lvl="2"/>
+            <a:r>
+              <a:rPr lang="en-US" dirty="0" smtClean="0"/>
+              <a:t>High rainy </a:t>
+            </a:r>
+            <a:r>
+              <a:rPr lang="en-US" dirty="0"/>
+              <a:t>days could </a:t>
+            </a:r>
+            <a:r>
+              <a:rPr lang="en-US" dirty="0" smtClean="0"/>
+              <a:t>create </a:t>
+            </a:r>
+            <a:r>
+              <a:rPr lang="en-US" dirty="0"/>
+              <a:t>flush events [3]</a:t>
+            </a:r>
+          </a:p>
+          <a:p>
+            <a:pPr lvl="1"/>
+            <a:r>
+              <a:rPr lang="en-US" dirty="0" smtClean="0"/>
+              <a:t>Use </a:t>
+            </a:r>
+            <a:r>
+              <a:rPr lang="en-US" dirty="0" smtClean="0"/>
+              <a:t>mean of max consecutive rainy days (rainfall-</a:t>
+            </a:r>
+            <a:r>
+              <a:rPr lang="en-US" dirty="0" err="1" smtClean="0"/>
+              <a:t>avg</a:t>
+            </a:r>
+            <a:r>
+              <a:rPr lang="en-US" dirty="0" smtClean="0"/>
+              <a:t> &gt; 0) for weeks -1:-4, -5:-8, -9:-12</a:t>
+            </a:r>
+          </a:p>
+          <a:p>
+            <a:pPr lvl="2"/>
+            <a:r>
+              <a:rPr lang="en-US" dirty="0" smtClean="0"/>
+              <a:t>A combination of high and low consecutive rainy days could create stagnant conditions</a:t>
+            </a:r>
+          </a:p>
+          <a:p>
+            <a:pPr lvl="2"/>
+            <a:r>
+              <a:rPr lang="en-US" dirty="0" smtClean="0"/>
+              <a:t>High consecutive rainy days could also create flush events [3]</a:t>
+            </a:r>
+            <a:endParaRPr lang="en-US" dirty="0"/>
+          </a:p>
+          <a:p>
+            <a:r>
+              <a:rPr lang="en-US" dirty="0" smtClean="0"/>
+              <a:t>Normalized population-sg</a:t>
+            </a:r>
+          </a:p>
+          <a:p>
+            <a:pPr lvl="1"/>
+            <a:r>
+              <a:rPr lang="en-US" dirty="0" smtClean="0"/>
+              <a:t>Mean of weeks -1:-20</a:t>
+            </a:r>
+          </a:p>
+          <a:p>
+            <a:r>
+              <a:rPr lang="en-US" dirty="0" smtClean="0"/>
+              <a:t>dengue-sg-log [1]</a:t>
+            </a:r>
+          </a:p>
+          <a:p>
+            <a:pPr lvl="1"/>
+            <a:r>
+              <a:rPr lang="en-US" dirty="0" smtClean="0"/>
+              <a:t>Weeks -1:-6</a:t>
+            </a:r>
+          </a:p>
+          <a:p>
+            <a:r>
+              <a:rPr lang="en-US" dirty="0" smtClean="0"/>
+              <a:t>Absolute humidity [4]</a:t>
+            </a:r>
+          </a:p>
+          <a:p>
+            <a:pPr lvl="1"/>
+            <a:r>
+              <a:rPr lang="en-US" dirty="0"/>
+              <a:t>Cross-Correlation </a:t>
+            </a:r>
+            <a:r>
+              <a:rPr lang="en-US" dirty="0" smtClean="0"/>
+              <a:t>Analysis showed lag week = 4</a:t>
+            </a:r>
+          </a:p>
+          <a:p>
+            <a:pPr lvl="1"/>
+            <a:endParaRPr lang="en-US" dirty="0" smtClean="0"/>
+          </a:p>
+        </p:txBody>
+      </p:sp>
+      <p:sp>
+        <p:nvSpPr>
+          <p:cNvPr id="4" name="Footer Placeholder 3"/>
+          <p:cNvSpPr>
+            <a:spLocks noGrp="1"/>
+          </p:cNvSpPr>
+          <p:nvPr>
+            <p:ph type="ftr" sz="quarter" idx="11"/>
           </p:nvPr>
         </p:nvSpPr>
         <p:spPr/>
@@ -4387,117 +4959,231 @@
           <a:lstStyle/>
           <a:p>
             <a:r>
-              <a:rPr lang="en-US" dirty="0" err="1" smtClean="0"/>
-              <a:t>Autocaffe</a:t>
-            </a:r>
-            <a:endParaRPr lang="en-US" dirty="0" smtClean="0"/>
-          </a:p>
-          <a:p>
-            <a:pPr lvl="1"/>
-            <a:r>
-              <a:rPr lang="en-US" dirty="0" smtClean="0"/>
-              <a:t>Verified that “dengue-sg” has no gaps in data</a:t>
-            </a:r>
-          </a:p>
-          <a:p>
-            <a:pPr lvl="1"/>
-            <a:r>
-              <a:rPr lang="en-US" dirty="0" smtClean="0"/>
-              <a:t>Average, maximum, minimum of temperature and rainfall aggregated from daily to weekly</a:t>
-            </a:r>
-          </a:p>
-          <a:p>
-            <a:pPr lvl="2"/>
-            <a:r>
-              <a:rPr lang="en-US" dirty="0" smtClean="0"/>
-              <a:t>Maximum consecutive days of rainfall (&gt; 0) within the week</a:t>
-            </a:r>
-          </a:p>
-          <a:p>
-            <a:pPr lvl="1"/>
-            <a:r>
-              <a:rPr lang="en-US" dirty="0" smtClean="0"/>
-              <a:t>“population-sg” </a:t>
-            </a:r>
-            <a:r>
-              <a:rPr lang="en-US" smtClean="0"/>
-              <a:t>midyear average</a:t>
-            </a:r>
-            <a:endParaRPr lang="en-US" dirty="0" smtClean="0"/>
-          </a:p>
-          <a:p>
-            <a:r>
-              <a:rPr lang="en-US" dirty="0" smtClean="0"/>
-              <a:t>Python</a:t>
-            </a:r>
-          </a:p>
-          <a:p>
-            <a:pPr lvl="1"/>
-            <a:r>
-              <a:rPr lang="en-US" dirty="0" smtClean="0"/>
-              <a:t>Spatial average to 5 regions (north, northeast, west, east, central)</a:t>
-            </a:r>
-          </a:p>
-          <a:p>
-            <a:pPr lvl="1"/>
-            <a:r>
-              <a:rPr lang="en-US" dirty="0" smtClean="0"/>
-              <a:t>Extrapolated missing past data for temperature-central</a:t>
-            </a:r>
-          </a:p>
-          <a:p>
-            <a:pPr lvl="2"/>
-            <a:r>
-              <a:rPr lang="en-US" dirty="0" smtClean="0"/>
-              <a:t>Use temperature by week-of-year for the past 5 “normal-looking” years</a:t>
-            </a:r>
-          </a:p>
-          <a:p>
-            <a:pPr lvl="2"/>
-            <a:r>
-              <a:rPr lang="en-US" dirty="0" smtClean="0"/>
-              <a:t>Find offset temperature from mean temperature of the past 5 years</a:t>
-            </a:r>
-          </a:p>
-          <a:p>
-            <a:pPr lvl="2"/>
-            <a:r>
-              <a:rPr lang="en-US" dirty="0" smtClean="0"/>
-              <a:t>Apply offset temperature to the mean annual temperature of temperature-</a:t>
-            </a:r>
-            <a:r>
-              <a:rPr lang="en-US" dirty="0" err="1" smtClean="0"/>
-              <a:t>changi</a:t>
-            </a:r>
-            <a:r>
-              <a:rPr lang="en-US" dirty="0" smtClean="0"/>
-              <a:t> (representative) to missing years</a:t>
-            </a:r>
-          </a:p>
-          <a:p>
-            <a:pPr lvl="2"/>
-            <a:r>
-              <a:rPr lang="en-US" dirty="0" smtClean="0"/>
-              <a:t>Scaled using IQR of temperatures in the year (avoid extreme/anomalies)</a:t>
-            </a:r>
-          </a:p>
-          <a:p>
-            <a:pPr lvl="1"/>
-            <a:r>
-              <a:rPr lang="en-US" dirty="0" smtClean="0"/>
-              <a:t>Averaged temperature across Singapore</a:t>
-            </a:r>
-          </a:p>
-          <a:p>
-            <a:pPr lvl="1"/>
-            <a:endParaRPr lang="en-US" dirty="0"/>
+              <a:rPr lang="en-US" sz="600" dirty="0"/>
+              <a:t>[</a:t>
+            </a:r>
+            <a:r>
+              <a:rPr lang="en-US" sz="600" dirty="0" smtClean="0"/>
+              <a:t>1] Y</a:t>
+            </a:r>
+            <a:r>
+              <a:rPr lang="en-US" sz="600" dirty="0"/>
+              <a:t>. L. </a:t>
+            </a:r>
+            <a:r>
+              <a:rPr lang="en-US" sz="600" dirty="0" err="1"/>
+              <a:t>Hii</a:t>
+            </a:r>
+            <a:r>
+              <a:rPr lang="en-US" sz="600" dirty="0"/>
+              <a:t>, H. Zhu, N. Ng, L. C. Ng, and J. </a:t>
+            </a:r>
+            <a:r>
+              <a:rPr lang="en-US" sz="600" dirty="0" err="1"/>
+              <a:t>Rocklöv</a:t>
+            </a:r>
+            <a:r>
+              <a:rPr lang="en-US" sz="600" dirty="0"/>
+              <a:t>, “Forecast of Dengue Incidence Using Temperature and Rainfall,” </a:t>
+            </a:r>
+            <a:r>
+              <a:rPr lang="en-US" sz="600" i="1" dirty="0"/>
+              <a:t>PLOS Neglected Tropical Diseases</a:t>
+            </a:r>
+            <a:r>
+              <a:rPr lang="en-US" sz="600" dirty="0"/>
+              <a:t>, vol. 6, no. 11, p. e1908, Nov. 2012, </a:t>
+            </a:r>
+            <a:r>
+              <a:rPr lang="en-US" sz="600" dirty="0" err="1"/>
+              <a:t>doi</a:t>
+            </a:r>
+            <a:r>
+              <a:rPr lang="en-US" sz="600" dirty="0"/>
+              <a:t>: 10.1371/journal.pntd.0001908</a:t>
+            </a:r>
+            <a:r>
+              <a:rPr lang="en-US" sz="600" dirty="0" smtClean="0"/>
+              <a:t>.</a:t>
+            </a:r>
+          </a:p>
+          <a:p>
+            <a:r>
+              <a:rPr lang="en-US" sz="600" dirty="0" smtClean="0"/>
+              <a:t>[2] Y</a:t>
+            </a:r>
+            <a:r>
+              <a:rPr lang="en-US" sz="600" dirty="0"/>
+              <a:t>. L. </a:t>
+            </a:r>
+            <a:r>
+              <a:rPr lang="en-US" sz="600" dirty="0" err="1"/>
+              <a:t>Hii</a:t>
+            </a:r>
+            <a:r>
+              <a:rPr lang="en-US" sz="600" dirty="0"/>
+              <a:t>, J. </a:t>
+            </a:r>
+            <a:r>
+              <a:rPr lang="en-US" sz="600" dirty="0" err="1"/>
+              <a:t>Rocklöv</a:t>
+            </a:r>
+            <a:r>
+              <a:rPr lang="en-US" sz="600" dirty="0"/>
+              <a:t>, N. Ng, C. S. Tang, F. Y. Pang, and R. </a:t>
+            </a:r>
+            <a:r>
+              <a:rPr lang="en-US" sz="600" dirty="0" err="1"/>
+              <a:t>Sauerborn</a:t>
+            </a:r>
+            <a:r>
+              <a:rPr lang="en-US" sz="600" dirty="0"/>
+              <a:t>, “Climate variability and increase in intensity and magnitude of dengue incidence in Singapore,” </a:t>
+            </a:r>
+            <a:r>
+              <a:rPr lang="en-US" sz="600" i="1" dirty="0"/>
+              <a:t>Glob Health Action</a:t>
+            </a:r>
+            <a:r>
+              <a:rPr lang="en-US" sz="600" dirty="0"/>
+              <a:t>, vol. 2, Nov. 2009, </a:t>
+            </a:r>
+            <a:r>
+              <a:rPr lang="en-US" sz="600" dirty="0" err="1"/>
+              <a:t>doi</a:t>
+            </a:r>
+            <a:r>
+              <a:rPr lang="en-US" sz="600" dirty="0"/>
+              <a:t>: 10.3402/gha.v2i0.2036</a:t>
+            </a:r>
+            <a:r>
+              <a:rPr lang="en-US" sz="600" dirty="0" smtClean="0"/>
+              <a:t>.</a:t>
+            </a:r>
+          </a:p>
+          <a:p>
+            <a:r>
+              <a:rPr lang="en-US" sz="600" dirty="0" smtClean="0"/>
+              <a:t>[3] C</a:t>
+            </a:r>
+            <a:r>
+              <a:rPr lang="en-US" sz="600" dirty="0"/>
+              <a:t>. M. </a:t>
+            </a:r>
+            <a:r>
+              <a:rPr lang="en-US" sz="600" dirty="0" err="1"/>
+              <a:t>Benedum</a:t>
+            </a:r>
+            <a:r>
+              <a:rPr lang="en-US" sz="600" dirty="0"/>
+              <a:t>, O. M. E. </a:t>
+            </a:r>
+            <a:r>
+              <a:rPr lang="en-US" sz="600" dirty="0" err="1"/>
+              <a:t>Seidahmed</a:t>
+            </a:r>
+            <a:r>
+              <a:rPr lang="en-US" sz="600" dirty="0"/>
+              <a:t>, E. A. B. </a:t>
+            </a:r>
+            <a:r>
+              <a:rPr lang="en-US" sz="600" dirty="0" err="1"/>
+              <a:t>Eltahir</a:t>
+            </a:r>
+            <a:r>
+              <a:rPr lang="en-US" sz="600" dirty="0"/>
+              <a:t>, and N. </a:t>
+            </a:r>
+            <a:r>
+              <a:rPr lang="en-US" sz="600" dirty="0" err="1"/>
+              <a:t>Markuzon</a:t>
+            </a:r>
+            <a:r>
+              <a:rPr lang="en-US" sz="600" dirty="0"/>
+              <a:t>, “Statistical modeling of the effect of rainfall flushing on dengue transmission in Singapore,” </a:t>
+            </a:r>
+            <a:r>
+              <a:rPr lang="en-US" sz="600" i="1" dirty="0"/>
+              <a:t>PLOS Neglected Tropical Diseases</a:t>
+            </a:r>
+            <a:r>
+              <a:rPr lang="en-US" sz="600" dirty="0"/>
+              <a:t>, vol. 12, no. 12, p. e0006935, Dec. 2018, </a:t>
+            </a:r>
+            <a:r>
+              <a:rPr lang="en-US" sz="600" dirty="0" err="1"/>
+              <a:t>doi</a:t>
+            </a:r>
+            <a:r>
+              <a:rPr lang="en-US" sz="600" dirty="0"/>
+              <a:t>: 10.1371/journal.pntd.0006935</a:t>
+            </a:r>
+            <a:r>
+              <a:rPr lang="en-US" sz="600" dirty="0" smtClean="0"/>
+              <a:t>.</a:t>
+            </a:r>
+          </a:p>
+          <a:p>
+            <a:r>
+              <a:rPr lang="en-US" sz="600" dirty="0" smtClean="0"/>
+              <a:t>[4] T</a:t>
+            </a:r>
+            <a:r>
+              <a:rPr lang="en-US" sz="600" dirty="0"/>
+              <a:t>. M. </a:t>
+            </a:r>
+            <a:r>
+              <a:rPr lang="en-US" sz="600" dirty="0" err="1"/>
+              <a:t>Carvajal</a:t>
+            </a:r>
+            <a:r>
+              <a:rPr lang="en-US" sz="600" dirty="0"/>
+              <a:t>, K. M. </a:t>
+            </a:r>
+            <a:r>
+              <a:rPr lang="en-US" sz="600" dirty="0" err="1"/>
+              <a:t>Viacrusis</a:t>
+            </a:r>
+            <a:r>
+              <a:rPr lang="en-US" sz="600" dirty="0"/>
+              <a:t>, L. F. T. Hernandez, H. T. Ho, D. M. </a:t>
+            </a:r>
+            <a:r>
+              <a:rPr lang="en-US" sz="600" dirty="0" err="1"/>
+              <a:t>Amalin</a:t>
+            </a:r>
+            <a:r>
+              <a:rPr lang="en-US" sz="600" dirty="0"/>
+              <a:t>, and K. Watanabe, “Machine learning methods reveal the temporal pattern of dengue incidence using meteorological factors in metropolitan Manila, Philippines,” </a:t>
+            </a:r>
+            <a:r>
+              <a:rPr lang="en-US" sz="600" i="1" dirty="0"/>
+              <a:t>BMC Infect. Dis.</a:t>
+            </a:r>
+            <a:r>
+              <a:rPr lang="en-US" sz="600" dirty="0"/>
+              <a:t>, vol. 18, no. 1, p. 183, 17 2018, </a:t>
+            </a:r>
+            <a:r>
+              <a:rPr lang="en-US" sz="600" dirty="0" err="1"/>
+              <a:t>doi</a:t>
+            </a:r>
+            <a:r>
+              <a:rPr lang="en-US" sz="600" dirty="0"/>
+              <a:t>: 10.1186/s12879-018-3066-0</a:t>
+            </a:r>
+            <a:r>
+              <a:rPr lang="en-US" sz="600" dirty="0" smtClean="0"/>
+              <a:t>.</a:t>
+            </a:r>
+            <a:endParaRPr lang="en-US" sz="600" dirty="0"/>
           </a:p>
         </p:txBody>
       </p:sp>
     </p:spTree>
     <p:extLst>
       <p:ext uri="{BB962C8B-B14F-4D97-AF65-F5344CB8AC3E}">
-        <p14:creationId xmlns:p14="http://schemas.microsoft.com/office/powerpoint/2010/main" val="158578986"/>
+        <p14:creationId xmlns:p14="http://schemas.microsoft.com/office/powerpoint/2010/main" val="3406827708"/>
       </p:ext>
     </p:extLst>
   </p:cSld>
@@ -4541,7 +5227,11 @@
           <a:p>
             <a:r>
               <a:rPr lang="en-US" dirty="0" smtClean="0"/>
-              <a:t>Feature engineering</a:t>
+              <a:t>Data </a:t>
+            </a:r>
+            <a:r>
+              <a:rPr lang="en-US" dirty="0" smtClean="0"/>
+              <a:t>extraction (unused)</a:t>
             </a:r>
             <a:endParaRPr lang="en-US" dirty="0"/>
           </a:p>
@@ -4555,222 +5245,6 @@
           </p:cNvSpPr>
           <p:nvPr>
             <p:ph idx="1"/>
-          </p:nvPr>
-        </p:nvSpPr>
-        <p:spPr/>
-        <p:txBody>
-          <a:bodyPr>
-            <a:normAutofit lnSpcReduction="10000"/>
-          </a:bodyPr>
-          <a:lstStyle/>
-          <a:p>
-            <a:r>
-              <a:rPr lang="en-US" dirty="0" smtClean="0"/>
-              <a:t>Use dengue-sg-log as output [1]</a:t>
-            </a:r>
-          </a:p>
-          <a:p>
-            <a:r>
-              <a:rPr lang="en-US" dirty="0" smtClean="0"/>
-              <a:t>Temperature data in 4-week blocks [2]</a:t>
-            </a:r>
-          </a:p>
-          <a:p>
-            <a:pPr lvl="1"/>
-            <a:r>
-              <a:rPr lang="en-US" dirty="0" smtClean="0"/>
-              <a:t>Use mean of temperature-</a:t>
-            </a:r>
-            <a:r>
-              <a:rPr lang="en-US" dirty="0" err="1" smtClean="0"/>
-              <a:t>avg</a:t>
-            </a:r>
-            <a:r>
-              <a:rPr lang="en-US" dirty="0" smtClean="0"/>
-              <a:t> for weeks -5:-8, -9:-12, -13:-16, and -17:-20</a:t>
-            </a:r>
-          </a:p>
-          <a:p>
-            <a:pPr lvl="1"/>
-            <a:r>
-              <a:rPr lang="en-US" dirty="0" smtClean="0"/>
-              <a:t>Label mean temperature-</a:t>
-            </a:r>
-            <a:r>
-              <a:rPr lang="en-US" dirty="0" err="1" smtClean="0"/>
-              <a:t>avg</a:t>
-            </a:r>
-            <a:r>
-              <a:rPr lang="en-US" dirty="0" smtClean="0"/>
-              <a:t> for weeks -17:-20</a:t>
-            </a:r>
-          </a:p>
-          <a:p>
-            <a:pPr lvl="2"/>
-            <a:r>
-              <a:rPr lang="en-US" dirty="0" smtClean="0"/>
-              <a:t>&lt; 27.8 </a:t>
-            </a:r>
-            <a:r>
-              <a:rPr lang="en-US" dirty="0" err="1" smtClean="0"/>
-              <a:t>degC</a:t>
-            </a:r>
-            <a:r>
-              <a:rPr lang="en-US" dirty="0" smtClean="0"/>
-              <a:t> as 1 else 0</a:t>
-            </a:r>
-          </a:p>
-          <a:p>
-            <a:r>
-              <a:rPr lang="en-US" dirty="0" smtClean="0"/>
-              <a:t>Rainfall data in 4-week blocks [2]</a:t>
-            </a:r>
-          </a:p>
-          <a:p>
-            <a:pPr lvl="1"/>
-            <a:r>
-              <a:rPr lang="en-US" dirty="0"/>
-              <a:t>Use mean of </a:t>
-            </a:r>
-            <a:r>
-              <a:rPr lang="en-US" dirty="0" smtClean="0"/>
-              <a:t>rainfall-</a:t>
-            </a:r>
-            <a:r>
-              <a:rPr lang="en-US" dirty="0" err="1" smtClean="0"/>
-              <a:t>avg</a:t>
-            </a:r>
-            <a:r>
-              <a:rPr lang="en-US" dirty="0" smtClean="0"/>
-              <a:t> </a:t>
-            </a:r>
-            <a:r>
-              <a:rPr lang="en-US" dirty="0"/>
-              <a:t>for weeks </a:t>
-            </a:r>
-            <a:r>
-              <a:rPr lang="en-US" dirty="0" smtClean="0"/>
-              <a:t>-1:-4, -5</a:t>
-            </a:r>
-            <a:r>
-              <a:rPr lang="en-US" dirty="0"/>
-              <a:t>:-8, -9:-12, -13:-16, and -17:-</a:t>
-            </a:r>
-            <a:r>
-              <a:rPr lang="en-US" dirty="0" smtClean="0"/>
-              <a:t>20</a:t>
-            </a:r>
-          </a:p>
-          <a:p>
-            <a:pPr lvl="1"/>
-            <a:r>
-              <a:rPr lang="en-US" dirty="0" smtClean="0"/>
-              <a:t>Label mean rainfall-</a:t>
-            </a:r>
-            <a:r>
-              <a:rPr lang="en-US" dirty="0" err="1" smtClean="0"/>
-              <a:t>avg</a:t>
-            </a:r>
-            <a:r>
-              <a:rPr lang="en-US" dirty="0" smtClean="0"/>
-              <a:t> for weeks -13:-16</a:t>
-            </a:r>
-          </a:p>
-          <a:p>
-            <a:pPr lvl="2"/>
-            <a:r>
-              <a:rPr lang="en-US" dirty="0" smtClean="0"/>
-              <a:t>&lt; 10.7 mm || &gt; 21.4 mm as 1 else 0</a:t>
-            </a:r>
-          </a:p>
-          <a:p>
-            <a:pPr lvl="1"/>
-            <a:r>
-              <a:rPr lang="en-US" dirty="0" smtClean="0"/>
-              <a:t>Use mean of max consecutive rainy days (rainfall-</a:t>
-            </a:r>
-            <a:r>
-              <a:rPr lang="en-US" dirty="0" err="1" smtClean="0"/>
-              <a:t>avg</a:t>
-            </a:r>
-            <a:r>
-              <a:rPr lang="en-US" dirty="0" smtClean="0"/>
-              <a:t> &gt; 0) for weeks -1:-4, -5:-8, -9:-12</a:t>
-            </a:r>
-          </a:p>
-          <a:p>
-            <a:pPr lvl="2"/>
-            <a:r>
-              <a:rPr lang="en-US" dirty="0" smtClean="0"/>
-              <a:t>A combination of high and low consecutive rainy days could create stagnant conditions</a:t>
-            </a:r>
-          </a:p>
-          <a:p>
-            <a:pPr lvl="2"/>
-            <a:r>
-              <a:rPr lang="en-US" dirty="0" smtClean="0"/>
-              <a:t>High consecutive rainy days could also create flush events [3]</a:t>
-            </a:r>
-            <a:endParaRPr lang="en-US" dirty="0"/>
-          </a:p>
-          <a:p>
-            <a:r>
-              <a:rPr lang="en-US" dirty="0" smtClean="0"/>
-              <a:t>Normalized population-sg</a:t>
-            </a:r>
-          </a:p>
-          <a:p>
-            <a:pPr lvl="1"/>
-            <a:r>
-              <a:rPr lang="en-US" dirty="0" smtClean="0"/>
-              <a:t>Mean of weeks -1:-20</a:t>
-            </a:r>
-          </a:p>
-          <a:p>
-            <a:r>
-              <a:rPr lang="en-US" dirty="0" smtClean="0"/>
-              <a:t>dengue-sg-log [1]</a:t>
-            </a:r>
-          </a:p>
-          <a:p>
-            <a:pPr lvl="1"/>
-            <a:r>
-              <a:rPr lang="en-US" dirty="0" smtClean="0"/>
-              <a:t>Weeks -1:-6</a:t>
-            </a:r>
-          </a:p>
-          <a:p>
-            <a:r>
-              <a:rPr lang="en-US" dirty="0" smtClean="0"/>
-              <a:t>Absolute humidity [4]</a:t>
-            </a:r>
-          </a:p>
-          <a:p>
-            <a:pPr lvl="1"/>
-            <a:r>
-              <a:rPr lang="en-US" dirty="0"/>
-              <a:t>Cross-Correlation </a:t>
-            </a:r>
-            <a:r>
-              <a:rPr lang="en-US" smtClean="0"/>
-              <a:t>Analysis showed lag week = 4</a:t>
-            </a:r>
-            <a:endParaRPr lang="en-US" dirty="0" smtClean="0"/>
-          </a:p>
-          <a:p>
-            <a:pPr lvl="1"/>
-            <a:endParaRPr lang="en-US" dirty="0" smtClean="0"/>
-          </a:p>
-        </p:txBody>
-      </p:sp>
-      <p:sp>
-        <p:nvSpPr>
-          <p:cNvPr id="4" name="Footer Placeholder 3"/>
-          <p:cNvSpPr>
-            <a:spLocks noGrp="1"/>
-          </p:cNvSpPr>
-          <p:nvPr>
-            <p:ph type="ftr" sz="quarter" idx="11"/>
           </p:nvPr>
         </p:nvSpPr>
         <p:spPr/>
@@ -4778,232 +5252,57 @@
           <a:bodyPr/>
           <a:lstStyle/>
           <a:p>
-            <a:r>
-              <a:rPr lang="en-US" sz="600" dirty="0"/>
-              <a:t>[</a:t>
-            </a:r>
-            <a:r>
-              <a:rPr lang="en-US" sz="600" dirty="0" smtClean="0"/>
-              <a:t>1] Y</a:t>
-            </a:r>
-            <a:r>
-              <a:rPr lang="en-US" sz="600" dirty="0"/>
-              <a:t>. L. </a:t>
-            </a:r>
-            <a:r>
-              <a:rPr lang="en-US" sz="600" dirty="0" err="1"/>
-              <a:t>Hii</a:t>
-            </a:r>
-            <a:r>
-              <a:rPr lang="en-US" sz="600" dirty="0"/>
-              <a:t>, H. Zhu, N. Ng, L. C. Ng, and J. </a:t>
-            </a:r>
-            <a:r>
-              <a:rPr lang="en-US" sz="600" dirty="0" err="1"/>
-              <a:t>Rocklöv</a:t>
-            </a:r>
-            <a:r>
-              <a:rPr lang="en-US" sz="600" dirty="0"/>
-              <a:t>, “Forecast of Dengue Incidence Using Temperature and Rainfall,” </a:t>
-            </a:r>
-            <a:r>
-              <a:rPr lang="en-US" sz="600" i="1" dirty="0"/>
-              <a:t>PLOS Neglected Tropical Diseases</a:t>
-            </a:r>
-            <a:r>
-              <a:rPr lang="en-US" sz="600" dirty="0"/>
-              <a:t>, vol. 6, no. 11, p. e1908, Nov. 2012, </a:t>
-            </a:r>
-            <a:r>
-              <a:rPr lang="en-US" sz="600" dirty="0" err="1"/>
-              <a:t>doi</a:t>
-            </a:r>
-            <a:r>
-              <a:rPr lang="en-US" sz="600" dirty="0"/>
-              <a:t>: 10.1371/journal.pntd.0001908</a:t>
-            </a:r>
-            <a:r>
-              <a:rPr lang="en-US" sz="600" dirty="0" smtClean="0"/>
-              <a:t>.</a:t>
-            </a:r>
-          </a:p>
-          <a:p>
-            <a:r>
-              <a:rPr lang="en-US" sz="600" dirty="0" smtClean="0"/>
-              <a:t>[2] Y</a:t>
-            </a:r>
-            <a:r>
-              <a:rPr lang="en-US" sz="600" dirty="0"/>
-              <a:t>. L. </a:t>
-            </a:r>
-            <a:r>
-              <a:rPr lang="en-US" sz="600" dirty="0" err="1"/>
-              <a:t>Hii</a:t>
-            </a:r>
-            <a:r>
-              <a:rPr lang="en-US" sz="600" dirty="0"/>
-              <a:t>, J. </a:t>
-            </a:r>
-            <a:r>
-              <a:rPr lang="en-US" sz="600" dirty="0" err="1"/>
-              <a:t>Rocklöv</a:t>
-            </a:r>
-            <a:r>
-              <a:rPr lang="en-US" sz="600" dirty="0"/>
-              <a:t>, N. Ng, C. S. Tang, F. Y. Pang, and R. </a:t>
-            </a:r>
-            <a:r>
-              <a:rPr lang="en-US" sz="600" dirty="0" err="1"/>
-              <a:t>Sauerborn</a:t>
-            </a:r>
-            <a:r>
-              <a:rPr lang="en-US" sz="600" dirty="0"/>
-              <a:t>, “Climate variability and increase in intensity and magnitude of dengue incidence in Singapore,” </a:t>
-            </a:r>
-            <a:r>
-              <a:rPr lang="en-US" sz="600" i="1" dirty="0"/>
-              <a:t>Glob Health Action</a:t>
-            </a:r>
-            <a:r>
-              <a:rPr lang="en-US" sz="600" dirty="0"/>
-              <a:t>, vol. 2, Nov. 2009, </a:t>
-            </a:r>
-            <a:r>
-              <a:rPr lang="en-US" sz="600" dirty="0" err="1"/>
-              <a:t>doi</a:t>
-            </a:r>
-            <a:r>
-              <a:rPr lang="en-US" sz="600" dirty="0"/>
-              <a:t>: 10.3402/gha.v2i0.2036</a:t>
-            </a:r>
-            <a:r>
-              <a:rPr lang="en-US" sz="600" dirty="0" smtClean="0"/>
-              <a:t>.</a:t>
-            </a:r>
-          </a:p>
-          <a:p>
-            <a:r>
-              <a:rPr lang="en-US" sz="600" dirty="0" smtClean="0"/>
-              <a:t>[3] C</a:t>
-            </a:r>
-            <a:r>
-              <a:rPr lang="en-US" sz="600" dirty="0"/>
-              <a:t>. M. </a:t>
-            </a:r>
-            <a:r>
-              <a:rPr lang="en-US" sz="600" dirty="0" err="1"/>
-              <a:t>Benedum</a:t>
-            </a:r>
-            <a:r>
-              <a:rPr lang="en-US" sz="600" dirty="0"/>
-              <a:t>, O. M. E. </a:t>
-            </a:r>
-            <a:r>
-              <a:rPr lang="en-US" sz="600" dirty="0" err="1"/>
-              <a:t>Seidahmed</a:t>
-            </a:r>
-            <a:r>
-              <a:rPr lang="en-US" sz="600" dirty="0"/>
-              <a:t>, E. A. B. </a:t>
-            </a:r>
-            <a:r>
-              <a:rPr lang="en-US" sz="600" dirty="0" err="1"/>
-              <a:t>Eltahir</a:t>
-            </a:r>
-            <a:r>
-              <a:rPr lang="en-US" sz="600" dirty="0"/>
-              <a:t>, and N. </a:t>
-            </a:r>
-            <a:r>
-              <a:rPr lang="en-US" sz="600" dirty="0" err="1"/>
-              <a:t>Markuzon</a:t>
-            </a:r>
-            <a:r>
-              <a:rPr lang="en-US" sz="600" dirty="0"/>
-              <a:t>, “Statistical modeling of the effect of rainfall flushing on dengue transmission in Singapore,” </a:t>
-            </a:r>
-            <a:r>
-              <a:rPr lang="en-US" sz="600" i="1" dirty="0"/>
-              <a:t>PLOS Neglected Tropical Diseases</a:t>
-            </a:r>
-            <a:r>
-              <a:rPr lang="en-US" sz="600" dirty="0"/>
-              <a:t>, vol. 12, no. 12, p. e0006935, Dec. 2018, </a:t>
-            </a:r>
-            <a:r>
-              <a:rPr lang="en-US" sz="600" dirty="0" err="1"/>
-              <a:t>doi</a:t>
-            </a:r>
-            <a:r>
-              <a:rPr lang="en-US" sz="600" dirty="0"/>
-              <a:t>: 10.1371/journal.pntd.0006935</a:t>
-            </a:r>
-            <a:r>
-              <a:rPr lang="en-US" sz="600" dirty="0" smtClean="0"/>
-              <a:t>.</a:t>
-            </a:r>
-          </a:p>
-          <a:p>
-            <a:r>
-              <a:rPr lang="en-US" sz="600" dirty="0" smtClean="0"/>
-              <a:t>[4] T</a:t>
-            </a:r>
-            <a:r>
-              <a:rPr lang="en-US" sz="600" dirty="0"/>
-              <a:t>. M. </a:t>
-            </a:r>
-            <a:r>
-              <a:rPr lang="en-US" sz="600" dirty="0" err="1"/>
-              <a:t>Carvajal</a:t>
-            </a:r>
-            <a:r>
-              <a:rPr lang="en-US" sz="600" dirty="0"/>
-              <a:t>, K. M. </a:t>
-            </a:r>
-            <a:r>
-              <a:rPr lang="en-US" sz="600" dirty="0" err="1"/>
-              <a:t>Viacrusis</a:t>
-            </a:r>
-            <a:r>
-              <a:rPr lang="en-US" sz="600" dirty="0"/>
-              <a:t>, L. F. T. Hernandez, H. T. Ho, D. M. </a:t>
-            </a:r>
-            <a:r>
-              <a:rPr lang="en-US" sz="600" dirty="0" err="1"/>
-              <a:t>Amalin</a:t>
-            </a:r>
-            <a:r>
-              <a:rPr lang="en-US" sz="600" dirty="0"/>
-              <a:t>, and K. Watanabe, “Machine learning methods reveal the temporal pattern of dengue incidence using meteorological factors in metropolitan Manila, Philippines,” </a:t>
-            </a:r>
-            <a:r>
-              <a:rPr lang="en-US" sz="600" i="1" dirty="0"/>
-              <a:t>BMC Infect. Dis.</a:t>
-            </a:r>
-            <a:r>
-              <a:rPr lang="en-US" sz="600" dirty="0"/>
-              <a:t>, vol. 18, no. 1, p. 183, 17 2018, </a:t>
-            </a:r>
-            <a:r>
-              <a:rPr lang="en-US" sz="600" dirty="0" err="1"/>
-              <a:t>doi</a:t>
-            </a:r>
-            <a:r>
-              <a:rPr lang="en-US" sz="600" dirty="0"/>
-              <a:t>: 10.1186/s12879-018-3066-0</a:t>
-            </a:r>
-            <a:r>
-              <a:rPr lang="en-US" sz="600" dirty="0" smtClean="0"/>
-              <a:t>.</a:t>
-            </a:r>
-            <a:endParaRPr lang="en-US" sz="600" dirty="0"/>
+            <a:pPr lvl="1"/>
+            <a:r>
+              <a:rPr lang="en-US" dirty="0"/>
+              <a:t>Extrapolated missing past data for temperature-central</a:t>
+            </a:r>
+          </a:p>
+          <a:p>
+            <a:pPr lvl="2"/>
+            <a:r>
+              <a:rPr lang="en-US" dirty="0"/>
+              <a:t>Use temperature by week-of-year for the past 5 “normal-looking” years</a:t>
+            </a:r>
+          </a:p>
+          <a:p>
+            <a:pPr lvl="2"/>
+            <a:r>
+              <a:rPr lang="en-US" dirty="0"/>
+              <a:t>Find offset temperature from mean temperature of the past 5 years</a:t>
+            </a:r>
+          </a:p>
+          <a:p>
+            <a:pPr lvl="2"/>
+            <a:r>
+              <a:rPr lang="en-US" dirty="0"/>
+              <a:t>Apply offset temperature to the mean annual temperature of temperature-</a:t>
+            </a:r>
+            <a:r>
+              <a:rPr lang="en-US" dirty="0" err="1"/>
+              <a:t>changi</a:t>
+            </a:r>
+            <a:r>
+              <a:rPr lang="en-US" dirty="0"/>
+              <a:t> (representative) to missing years</a:t>
+            </a:r>
+          </a:p>
+          <a:p>
+            <a:pPr lvl="2"/>
+            <a:r>
+              <a:rPr lang="en-US" dirty="0"/>
+              <a:t>Scaled using IQR of temperatures in the year (avoid extreme/anomalies)</a:t>
+            </a:r>
+          </a:p>
+          <a:p>
+            <a:endParaRPr lang="en-US" dirty="0"/>
           </a:p>
         </p:txBody>
       </p:sp>
     </p:spTree>
     <p:extLst>
       <p:ext uri="{BB962C8B-B14F-4D97-AF65-F5344CB8AC3E}">
-        <p14:creationId xmlns:p14="http://schemas.microsoft.com/office/powerpoint/2010/main" val="3406827708"/>
+        <p14:creationId xmlns:p14="http://schemas.microsoft.com/office/powerpoint/2010/main" val="2820005288"/>
       </p:ext>
     </p:extLst>
   </p:cSld>

</xml_diff>